<commit_message>
Updated image and additional tweaks
</commit_message>
<xml_diff>
--- a/images/f5-big-ip-virtual-edition-architecture-diagram.pptx
+++ b/images/f5-big-ip-virtual-edition-architecture-diagram.pptx
@@ -224,7 +224,7 @@
           <a:p>
             <a:fld id="{49A7721D-1176-A640-AC48-B82F78C92D56}" type="datetimeFigureOut">
               <a:rPr lang="en-US" smtClean="0"/>
-              <a:t>6/1/2022</a:t>
+              <a:t>6/23/2022</a:t>
             </a:fld>
             <a:endParaRPr lang="en-US" dirty="0"/>
           </a:p>
@@ -401,7 +401,7 @@
           <a:p>
             <a:fld id="{C884A089-FB25-6D46-9D21-F0F04A18BCA8}" type="datetimeFigureOut">
               <a:rPr lang="en-US" smtClean="0"/>
-              <a:t>6/1/2022</a:t>
+              <a:t>6/23/2022</a:t>
             </a:fld>
             <a:endParaRPr lang="en-US" dirty="0"/>
           </a:p>
@@ -1033,7 +1033,7 @@
           <a:p>
             <a:fld id="{C764DE79-268F-4C1A-8933-263129D2AF90}" type="datetimeFigureOut">
               <a:rPr lang="en-US" dirty="0"/>
-              <a:t>6/1/2022</a:t>
+              <a:t>6/23/2022</a:t>
             </a:fld>
             <a:endParaRPr lang="en-US" dirty="0"/>
           </a:p>
@@ -1204,7 +1204,7 @@
           <a:p>
             <a:fld id="{C764DE79-268F-4C1A-8933-263129D2AF90}" type="datetimeFigureOut">
               <a:rPr lang="en-US" dirty="0"/>
-              <a:t>6/1/2022</a:t>
+              <a:t>6/23/2022</a:t>
             </a:fld>
             <a:endParaRPr lang="en-US" dirty="0"/>
           </a:p>
@@ -1385,7 +1385,7 @@
           <a:p>
             <a:fld id="{C764DE79-268F-4C1A-8933-263129D2AF90}" type="datetimeFigureOut">
               <a:rPr lang="en-US" dirty="0"/>
-              <a:t>6/1/2022</a:t>
+              <a:t>6/23/2022</a:t>
             </a:fld>
             <a:endParaRPr lang="en-US" dirty="0"/>
           </a:p>
@@ -1578,7 +1578,7 @@
           <a:p>
             <a:fld id="{C764DE79-268F-4C1A-8933-263129D2AF90}" type="datetimeFigureOut">
               <a:rPr lang="en-US" dirty="0"/>
-              <a:t>6/1/2022</a:t>
+              <a:t>6/23/2022</a:t>
             </a:fld>
             <a:endParaRPr lang="en-US" dirty="0"/>
           </a:p>
@@ -1749,7 +1749,7 @@
           <a:p>
             <a:fld id="{C764DE79-268F-4C1A-8933-263129D2AF90}" type="datetimeFigureOut">
               <a:rPr lang="en-US" dirty="0"/>
-              <a:t>6/1/2022</a:t>
+              <a:t>6/23/2022</a:t>
             </a:fld>
             <a:endParaRPr lang="en-US" dirty="0"/>
           </a:p>
@@ -1994,7 +1994,7 @@
           <a:p>
             <a:fld id="{C764DE79-268F-4C1A-8933-263129D2AF90}" type="datetimeFigureOut">
               <a:rPr lang="en-US" dirty="0"/>
-              <a:t>6/1/2022</a:t>
+              <a:t>6/23/2022</a:t>
             </a:fld>
             <a:endParaRPr lang="en-US" dirty="0"/>
           </a:p>
@@ -2227,7 +2227,7 @@
           <a:p>
             <a:fld id="{C764DE79-268F-4C1A-8933-263129D2AF90}" type="datetimeFigureOut">
               <a:rPr lang="en-US" dirty="0"/>
-              <a:t>6/1/2022</a:t>
+              <a:t>6/23/2022</a:t>
             </a:fld>
             <a:endParaRPr lang="en-US" dirty="0"/>
           </a:p>
@@ -2595,7 +2595,7 @@
           <a:p>
             <a:fld id="{C764DE79-268F-4C1A-8933-263129D2AF90}" type="datetimeFigureOut">
               <a:rPr lang="en-US" dirty="0"/>
-              <a:t>6/1/2022</a:t>
+              <a:t>6/23/2022</a:t>
             </a:fld>
             <a:endParaRPr lang="en-US" dirty="0"/>
           </a:p>
@@ -2714,7 +2714,7 @@
           <a:p>
             <a:fld id="{C764DE79-268F-4C1A-8933-263129D2AF90}" type="datetimeFigureOut">
               <a:rPr lang="en-US" dirty="0"/>
-              <a:t>6/1/2022</a:t>
+              <a:t>6/23/2022</a:t>
             </a:fld>
             <a:endParaRPr lang="en-US" dirty="0"/>
           </a:p>
@@ -3083,7 +3083,7 @@
           <a:p>
             <a:fld id="{C764DE79-268F-4C1A-8933-263129D2AF90}" type="datetimeFigureOut">
               <a:rPr lang="en-US" dirty="0"/>
-              <a:t>6/1/2022</a:t>
+              <a:t>6/23/2022</a:t>
             </a:fld>
             <a:endParaRPr lang="en-US" dirty="0"/>
           </a:p>
@@ -3617,7 +3617,7 @@
           <a:p>
             <a:fld id="{C764DE79-268F-4C1A-8933-263129D2AF90}" type="datetimeFigureOut">
               <a:rPr lang="en-US" dirty="0"/>
-              <a:t>6/1/2022</a:t>
+              <a:t>6/23/2022</a:t>
             </a:fld>
             <a:endParaRPr lang="en-US" dirty="0"/>
           </a:p>
@@ -4038,7 +4038,7 @@
         <p:spPr>
           <a:xfrm>
             <a:off x="2011680" y="1463039"/>
-            <a:ext cx="10875645" cy="6585586"/>
+            <a:ext cx="10875645" cy="5318761"/>
           </a:xfrm>
           <a:prstGeom prst="rect">
             <a:avLst/>
@@ -4107,7 +4107,7 @@
         <p:spPr>
           <a:xfrm>
             <a:off x="2560319" y="2011679"/>
-            <a:ext cx="10157045" cy="5646421"/>
+            <a:ext cx="10157045" cy="4503421"/>
           </a:xfrm>
           <a:prstGeom prst="rect">
             <a:avLst/>
@@ -4176,7 +4176,7 @@
         </p:nvSpPr>
         <p:spPr>
           <a:xfrm>
-            <a:off x="3749040" y="5951220"/>
+            <a:off x="3749040" y="4842599"/>
             <a:ext cx="2674832" cy="1541145"/>
           </a:xfrm>
           <a:prstGeom prst="rect">
@@ -4243,7 +4243,7 @@
         <p:spPr>
           <a:xfrm>
             <a:off x="3749040" y="2162175"/>
-            <a:ext cx="2674832" cy="2572288"/>
+            <a:ext cx="2674832" cy="2481120"/>
           </a:xfrm>
           <a:prstGeom prst="rect">
             <a:avLst/>
@@ -4579,7 +4579,7 @@
         </p:blipFill>
         <p:spPr>
           <a:xfrm>
-            <a:off x="3749040" y="5951220"/>
+            <a:off x="3749040" y="4842599"/>
             <a:ext cx="381000" cy="381000"/>
           </a:xfrm>
           <a:prstGeom prst="rect">
@@ -4602,7 +4602,7 @@
         <p:spPr>
           <a:xfrm>
             <a:off x="3474720" y="1645920"/>
-            <a:ext cx="3170104" cy="6193156"/>
+            <a:ext cx="3170104" cy="4996180"/>
           </a:xfrm>
           <a:prstGeom prst="rect">
             <a:avLst/>
@@ -4664,66 +4664,6 @@
           </a:p>
         </p:txBody>
       </p:sp>
-      <p:pic>
-        <p:nvPicPr>
-          <p:cNvPr id="46" name="Graphic 8">
-            <a:extLst>
-              <a:ext uri="{FF2B5EF4-FFF2-40B4-BE49-F238E27FC236}">
-                <a16:creationId xmlns:a16="http://schemas.microsoft.com/office/drawing/2014/main" id="{ED39C559-DBB0-4856-A1D5-3C4D9AEF6697}"/>
-              </a:ext>
-            </a:extLst>
-          </p:cNvPr>
-          <p:cNvPicPr>
-            <a:picLocks noChangeAspect="1" noChangeArrowheads="1"/>
-          </p:cNvPicPr>
-          <p:nvPr/>
-        </p:nvPicPr>
-        <p:blipFill>
-          <a:blip r:embed="rId8">
-            <a:extLst>
-              <a:ext uri="{28A0092B-C50C-407E-A947-70E740481C1C}">
-                <a14:useLocalDpi xmlns:a14="http://schemas.microsoft.com/office/drawing/2010/main" val="0"/>
-              </a:ext>
-            </a:extLst>
-          </a:blip>
-          <a:srcRect/>
-          <a:stretch>
-            <a:fillRect/>
-          </a:stretch>
-        </p:blipFill>
-        <p:spPr bwMode="auto">
-          <a:xfrm>
-            <a:off x="11642783" y="2465634"/>
-            <a:ext cx="762000" cy="762000"/>
-          </a:xfrm>
-          <a:prstGeom prst="rect">
-            <a:avLst/>
-          </a:prstGeom>
-          <a:noFill/>
-          <a:ln>
-            <a:noFill/>
-          </a:ln>
-          <a:extLst>
-            <a:ext uri="{909E8E84-426E-40DD-AFC4-6F175D3DCCD1}">
-              <a14:hiddenFill xmlns:a14="http://schemas.microsoft.com/office/drawing/2010/main">
-                <a:solidFill>
-                  <a:srgbClr val="FFFFFF"/>
-                </a:solidFill>
-              </a14:hiddenFill>
-            </a:ext>
-            <a:ext uri="{91240B29-F687-4F45-9708-019B960494DF}">
-              <a14:hiddenLine xmlns:a14="http://schemas.microsoft.com/office/drawing/2010/main" w="9525">
-                <a:solidFill>
-                  <a:srgbClr val="000000"/>
-                </a:solidFill>
-                <a:miter lim="800000"/>
-                <a:headEnd/>
-                <a:tailEnd/>
-              </a14:hiddenLine>
-            </a:ext>
-          </a:extLst>
-        </p:spPr>
-      </p:pic>
       <p:sp>
         <p:nvSpPr>
           <p:cNvPr id="47" name="TextBox 9">
@@ -4740,7 +4680,7 @@
         </p:nvSpPr>
         <p:spPr bwMode="auto">
           <a:xfrm>
-            <a:off x="11444609" y="3284397"/>
+            <a:off x="11485532" y="5083997"/>
             <a:ext cx="1204595" cy="276999"/>
           </a:xfrm>
           <a:prstGeom prst="rect">
@@ -4880,7 +4820,7 @@
                 <a:ea typeface="Amazon Ember" panose="020B0603020204020204" pitchFamily="34" charset="0"/>
                 <a:cs typeface="Arial" panose="020B0604020202020204" pitchFamily="34" charset="0"/>
               </a:rPr>
-              <a:t>Amazon S3</a:t>
+              <a:t>S3 bucket</a:t>
             </a:r>
           </a:p>
         </p:txBody>
@@ -4900,7 +4840,7 @@
           <p:nvPr/>
         </p:nvPicPr>
         <p:blipFill>
-          <a:blip r:embed="rId9">
+          <a:blip r:embed="rId8">
             <a:extLst>
               <a:ext uri="{28A0092B-C50C-407E-A947-70E740481C1C}">
                 <a14:useLocalDpi xmlns:a14="http://schemas.microsoft.com/office/drawing/2010/main" val="0"/>
@@ -5120,7 +5060,7 @@
         </p:nvSpPr>
         <p:spPr>
           <a:xfrm>
-            <a:off x="8419322" y="5957104"/>
+            <a:off x="8419322" y="4864904"/>
             <a:ext cx="2679192" cy="1545336"/>
           </a:xfrm>
           <a:prstGeom prst="rect">
@@ -5187,7 +5127,7 @@
         <p:spPr>
           <a:xfrm>
             <a:off x="8414952" y="2162175"/>
-            <a:ext cx="2679192" cy="2569464"/>
+            <a:ext cx="2679192" cy="2481120"/>
           </a:xfrm>
           <a:prstGeom prst="rect">
             <a:avLst/>
@@ -5523,7 +5463,7 @@
         </p:blipFill>
         <p:spPr>
           <a:xfrm>
-            <a:off x="8414952" y="5963291"/>
+            <a:off x="8414952" y="4871091"/>
             <a:ext cx="381000" cy="381000"/>
           </a:xfrm>
           <a:prstGeom prst="rect">
@@ -5546,7 +5486,7 @@
         <p:spPr>
           <a:xfrm>
             <a:off x="8174595" y="1645920"/>
-            <a:ext cx="3185761" cy="6193156"/>
+            <a:ext cx="3185761" cy="4996180"/>
           </a:xfrm>
           <a:prstGeom prst="rect">
             <a:avLst/>
@@ -5623,11 +5563,11 @@
           <p:nvPr/>
         </p:nvPicPr>
         <p:blipFill>
-          <a:blip r:embed="rId10">
+          <a:blip r:embed="rId9">
             <a:extLst>
               <a:ext uri="{BEBA8EAE-BF5A-486C-A8C5-ECC9F3942E4B}">
                 <a14:imgProps xmlns:a14="http://schemas.microsoft.com/office/drawing/2010/main">
-                  <a14:imgLayer r:embed="rId11">
+                  <a14:imgLayer r:embed="rId10">
                     <a14:imgEffect>
                       <a14:artisticBlur/>
                     </a14:imgEffect>
@@ -5959,10 +5899,10 @@
           <p:nvPr/>
         </p:nvPicPr>
         <p:blipFill>
-          <a:blip r:embed="rId12">
+          <a:blip r:embed="rId11">
             <a:extLst>
               <a:ext uri="{96DAC541-7B7A-43D3-8B79-37D633B846F1}">
-                <asvg:svgBlip xmlns:asvg="http://schemas.microsoft.com/office/drawing/2016/SVG/main" r:embed="rId13"/>
+                <asvg:svgBlip xmlns:asvg="http://schemas.microsoft.com/office/drawing/2016/SVG/main" r:embed="rId12"/>
               </a:ext>
             </a:extLst>
           </a:blip>
@@ -5995,7 +5935,7 @@
           <p:nvPr/>
         </p:nvPicPr>
         <p:blipFill>
-          <a:blip r:embed="rId9">
+          <a:blip r:embed="rId8">
             <a:extLst>
               <a:ext uri="{28A0092B-C50C-407E-A947-70E740481C1C}">
                 <a14:useLocalDpi xmlns:a14="http://schemas.microsoft.com/office/drawing/2010/main" val="0"/>
@@ -6009,7 +5949,7 @@
         </p:blipFill>
         <p:spPr bwMode="auto">
           <a:xfrm>
-            <a:off x="5459884" y="4867000"/>
+            <a:off x="5459884" y="3685900"/>
             <a:ext cx="457200" cy="457200"/>
           </a:xfrm>
           <a:prstGeom prst="rect">
@@ -6056,7 +5996,7 @@
         </p:nvSpPr>
         <p:spPr bwMode="auto">
           <a:xfrm>
-            <a:off x="5108020" y="5337006"/>
+            <a:off x="5108020" y="4155906"/>
             <a:ext cx="1115568" cy="430887"/>
           </a:xfrm>
           <a:prstGeom prst="rect">
@@ -6216,7 +6156,7 @@
           <p:nvPr/>
         </p:nvPicPr>
         <p:blipFill>
-          <a:blip r:embed="rId9">
+          <a:blip r:embed="rId8">
             <a:extLst>
               <a:ext uri="{28A0092B-C50C-407E-A947-70E740481C1C}">
                 <a14:useLocalDpi xmlns:a14="http://schemas.microsoft.com/office/drawing/2010/main" val="0"/>
@@ -6276,10 +6216,10 @@
           <p:nvPr/>
         </p:nvPicPr>
         <p:blipFill>
-          <a:blip r:embed="rId14">
+          <a:blip r:embed="rId13">
             <a:extLst>
               <a:ext uri="{96DAC541-7B7A-43D3-8B79-37D633B846F1}">
-                <asvg:svgBlip xmlns:asvg="http://schemas.microsoft.com/office/drawing/2016/SVG/main" r:embed="rId15"/>
+                <asvg:svgBlip xmlns:asvg="http://schemas.microsoft.com/office/drawing/2016/SVG/main" r:embed="rId14"/>
               </a:ext>
             </a:extLst>
           </a:blip>
@@ -6312,10 +6252,10 @@
           <p:nvPr/>
         </p:nvPicPr>
         <p:blipFill>
-          <a:blip r:embed="rId16">
+          <a:blip r:embed="rId15">
             <a:extLst>
               <a:ext uri="{96DAC541-7B7A-43D3-8B79-37D633B846F1}">
-                <asvg:svgBlip xmlns:asvg="http://schemas.microsoft.com/office/drawing/2016/SVG/main" r:embed="rId17"/>
+                <asvg:svgBlip xmlns:asvg="http://schemas.microsoft.com/office/drawing/2016/SVG/main" r:embed="rId16"/>
               </a:ext>
             </a:extLst>
           </a:blip>
@@ -6495,227 +6435,6 @@
       </p:sp>
       <p:sp>
         <p:nvSpPr>
-          <p:cNvPr id="37" name="TextBox 18">
-            <a:extLst>
-              <a:ext uri="{FF2B5EF4-FFF2-40B4-BE49-F238E27FC236}">
-                <a16:creationId xmlns:a16="http://schemas.microsoft.com/office/drawing/2014/main" id="{98AEAE80-02BE-42B7-9BEA-6C9CC2B912A9}"/>
-              </a:ext>
-            </a:extLst>
-          </p:cNvPr>
-          <p:cNvSpPr txBox="1">
-            <a:spLocks noChangeArrowheads="1"/>
-          </p:cNvSpPr>
-          <p:nvPr/>
-        </p:nvSpPr>
-        <p:spPr bwMode="auto">
-          <a:xfrm>
-            <a:off x="5023377" y="4121362"/>
-            <a:ext cx="1342852" cy="430887"/>
-          </a:xfrm>
-          <a:prstGeom prst="rect">
-            <a:avLst/>
-          </a:prstGeom>
-          <a:noFill/>
-          <a:ln>
-            <a:noFill/>
-          </a:ln>
-          <a:extLst>
-            <a:ext uri="{909E8E84-426E-40DD-AFC4-6F175D3DCCD1}">
-              <a14:hiddenFill xmlns:a14="http://schemas.microsoft.com/office/drawing/2010/main">
-                <a:solidFill>
-                  <a:srgbClr val="FFFFFF"/>
-                </a:solidFill>
-              </a14:hiddenFill>
-            </a:ext>
-            <a:ext uri="{91240B29-F687-4F45-9708-019B960494DF}">
-              <a14:hiddenLine xmlns:a14="http://schemas.microsoft.com/office/drawing/2010/main" w="9525">
-                <a:solidFill>
-                  <a:srgbClr val="000000"/>
-                </a:solidFill>
-                <a:miter lim="800000"/>
-                <a:headEnd/>
-                <a:tailEnd/>
-              </a14:hiddenLine>
-            </a:ext>
-          </a:extLst>
-        </p:spPr>
-        <p:txBody>
-          <a:bodyPr wrap="square">
-            <a:spAutoFit/>
-          </a:bodyPr>
-          <a:lstStyle>
-            <a:lvl1pPr>
-              <a:defRPr>
-                <a:solidFill>
-                  <a:schemeClr val="tx1"/>
-                </a:solidFill>
-                <a:latin typeface="Calibri" panose="020F0502020204030204" pitchFamily="34" charset="0"/>
-              </a:defRPr>
-            </a:lvl1pPr>
-            <a:lvl2pPr marL="742950" indent="-285750">
-              <a:defRPr>
-                <a:solidFill>
-                  <a:schemeClr val="tx1"/>
-                </a:solidFill>
-                <a:latin typeface="Calibri" panose="020F0502020204030204" pitchFamily="34" charset="0"/>
-              </a:defRPr>
-            </a:lvl2pPr>
-            <a:lvl3pPr marL="1143000" indent="-228600">
-              <a:defRPr>
-                <a:solidFill>
-                  <a:schemeClr val="tx1"/>
-                </a:solidFill>
-                <a:latin typeface="Calibri" panose="020F0502020204030204" pitchFamily="34" charset="0"/>
-              </a:defRPr>
-            </a:lvl3pPr>
-            <a:lvl4pPr marL="1600200" indent="-228600">
-              <a:defRPr>
-                <a:solidFill>
-                  <a:schemeClr val="tx1"/>
-                </a:solidFill>
-                <a:latin typeface="Calibri" panose="020F0502020204030204" pitchFamily="34" charset="0"/>
-              </a:defRPr>
-            </a:lvl4pPr>
-            <a:lvl5pPr marL="2057400" indent="-228600">
-              <a:defRPr>
-                <a:solidFill>
-                  <a:schemeClr val="tx1"/>
-                </a:solidFill>
-                <a:latin typeface="Calibri" panose="020F0502020204030204" pitchFamily="34" charset="0"/>
-              </a:defRPr>
-            </a:lvl5pPr>
-            <a:lvl6pPr marL="2514600" indent="-228600" eaLnBrk="0" fontAlgn="base" hangingPunct="0">
-              <a:spcBef>
-                <a:spcPct val="0"/>
-              </a:spcBef>
-              <a:spcAft>
-                <a:spcPct val="0"/>
-              </a:spcAft>
-              <a:defRPr>
-                <a:solidFill>
-                  <a:schemeClr val="tx1"/>
-                </a:solidFill>
-                <a:latin typeface="Calibri" panose="020F0502020204030204" pitchFamily="34" charset="0"/>
-              </a:defRPr>
-            </a:lvl6pPr>
-            <a:lvl7pPr marL="2971800" indent="-228600" eaLnBrk="0" fontAlgn="base" hangingPunct="0">
-              <a:spcBef>
-                <a:spcPct val="0"/>
-              </a:spcBef>
-              <a:spcAft>
-                <a:spcPct val="0"/>
-              </a:spcAft>
-              <a:defRPr>
-                <a:solidFill>
-                  <a:schemeClr val="tx1"/>
-                </a:solidFill>
-                <a:latin typeface="Calibri" panose="020F0502020204030204" pitchFamily="34" charset="0"/>
-              </a:defRPr>
-            </a:lvl7pPr>
-            <a:lvl8pPr marL="3429000" indent="-228600" eaLnBrk="0" fontAlgn="base" hangingPunct="0">
-              <a:spcBef>
-                <a:spcPct val="0"/>
-              </a:spcBef>
-              <a:spcAft>
-                <a:spcPct val="0"/>
-              </a:spcAft>
-              <a:defRPr>
-                <a:solidFill>
-                  <a:schemeClr val="tx1"/>
-                </a:solidFill>
-                <a:latin typeface="Calibri" panose="020F0502020204030204" pitchFamily="34" charset="0"/>
-              </a:defRPr>
-            </a:lvl8pPr>
-            <a:lvl9pPr marL="3886200" indent="-228600" eaLnBrk="0" fontAlgn="base" hangingPunct="0">
-              <a:spcBef>
-                <a:spcPct val="0"/>
-              </a:spcBef>
-              <a:spcAft>
-                <a:spcPct val="0"/>
-              </a:spcAft>
-              <a:defRPr>
-                <a:solidFill>
-                  <a:schemeClr val="tx1"/>
-                </a:solidFill>
-                <a:latin typeface="Calibri" panose="020F0502020204030204" pitchFamily="34" charset="0"/>
-              </a:defRPr>
-            </a:lvl9pPr>
-          </a:lstStyle>
-          <a:p>
-            <a:pPr algn="ctr" eaLnBrk="1" hangingPunct="1"/>
-            <a:r>
-              <a:rPr lang="en-US" altLang="en-US" sz="1100" dirty="0">
-                <a:latin typeface="Arial" panose="020B0604020202020204" pitchFamily="34" charset="0"/>
-                <a:ea typeface="Amazon Ember" panose="020B0603020204020204" pitchFamily="34" charset="0"/>
-                <a:cs typeface="Arial" panose="020B0604020202020204" pitchFamily="34" charset="0"/>
-              </a:rPr>
-              <a:t>Elastic network interface</a:t>
-            </a:r>
-          </a:p>
-        </p:txBody>
-      </p:sp>
-      <p:pic>
-        <p:nvPicPr>
-          <p:cNvPr id="38" name="Graphic 37">
-            <a:extLst>
-              <a:ext uri="{FF2B5EF4-FFF2-40B4-BE49-F238E27FC236}">
-                <a16:creationId xmlns:a16="http://schemas.microsoft.com/office/drawing/2014/main" id="{A458B7DC-226F-4733-83E7-8476479CC200}"/>
-              </a:ext>
-            </a:extLst>
-          </p:cNvPr>
-          <p:cNvPicPr>
-            <a:picLocks noChangeAspect="1" noChangeArrowheads="1"/>
-          </p:cNvPicPr>
-          <p:nvPr/>
-        </p:nvPicPr>
-        <p:blipFill>
-          <a:blip r:embed="rId18">
-            <a:extLst>
-              <a:ext uri="{28A0092B-C50C-407E-A947-70E740481C1C}">
-                <a14:useLocalDpi xmlns:a14="http://schemas.microsoft.com/office/drawing/2010/main" val="0"/>
-              </a:ext>
-            </a:extLst>
-          </a:blip>
-          <a:srcRect/>
-          <a:stretch>
-            <a:fillRect/>
-          </a:stretch>
-        </p:blipFill>
-        <p:spPr bwMode="auto">
-          <a:xfrm>
-            <a:off x="5466419" y="3667166"/>
-            <a:ext cx="457200" cy="457200"/>
-          </a:xfrm>
-          <a:prstGeom prst="rect">
-            <a:avLst/>
-          </a:prstGeom>
-          <a:noFill/>
-          <a:ln>
-            <a:noFill/>
-          </a:ln>
-          <a:extLst>
-            <a:ext uri="{909E8E84-426E-40DD-AFC4-6F175D3DCCD1}">
-              <a14:hiddenFill xmlns:a14="http://schemas.microsoft.com/office/drawing/2010/main">
-                <a:solidFill>
-                  <a:srgbClr val="FFFFFF"/>
-                </a:solidFill>
-              </a14:hiddenFill>
-            </a:ext>
-            <a:ext uri="{91240B29-F687-4F45-9708-019B960494DF}">
-              <a14:hiddenLine xmlns:a14="http://schemas.microsoft.com/office/drawing/2010/main" w="9525">
-                <a:solidFill>
-                  <a:srgbClr val="000000"/>
-                </a:solidFill>
-                <a:miter lim="800000"/>
-                <a:headEnd/>
-                <a:tailEnd/>
-              </a14:hiddenLine>
-            </a:ext>
-          </a:extLst>
-        </p:spPr>
-      </p:pic>
-      <p:sp>
-        <p:nvSpPr>
           <p:cNvPr id="33" name="TextBox 16">
             <a:extLst>
               <a:ext uri="{FF2B5EF4-FFF2-40B4-BE49-F238E27FC236}">
@@ -6730,7 +6449,7 @@
         </p:nvSpPr>
         <p:spPr bwMode="auto">
           <a:xfrm>
-            <a:off x="3741836" y="6900525"/>
+            <a:off x="3741836" y="5791904"/>
             <a:ext cx="1115568" cy="430887"/>
           </a:xfrm>
           <a:prstGeom prst="rect">
@@ -6891,7 +6610,7 @@
         </p:nvSpPr>
         <p:spPr bwMode="auto">
           <a:xfrm>
-            <a:off x="8481309" y="6909524"/>
+            <a:off x="8481309" y="5817324"/>
             <a:ext cx="1115568" cy="430887"/>
           </a:xfrm>
           <a:prstGeom prst="rect">
@@ -7036,227 +6755,6 @@
           </a:p>
         </p:txBody>
       </p:sp>
-      <p:sp>
-        <p:nvSpPr>
-          <p:cNvPr id="54" name="TextBox 18">
-            <a:extLst>
-              <a:ext uri="{FF2B5EF4-FFF2-40B4-BE49-F238E27FC236}">
-                <a16:creationId xmlns:a16="http://schemas.microsoft.com/office/drawing/2014/main" id="{B84DC7CF-8A31-4A96-A923-C351CF08A954}"/>
-              </a:ext>
-            </a:extLst>
-          </p:cNvPr>
-          <p:cNvSpPr txBox="1">
-            <a:spLocks noChangeArrowheads="1"/>
-          </p:cNvSpPr>
-          <p:nvPr/>
-        </p:nvSpPr>
-        <p:spPr bwMode="auto">
-          <a:xfrm>
-            <a:off x="9826745" y="4147221"/>
-            <a:ext cx="1342852" cy="430887"/>
-          </a:xfrm>
-          <a:prstGeom prst="rect">
-            <a:avLst/>
-          </a:prstGeom>
-          <a:noFill/>
-          <a:ln>
-            <a:noFill/>
-          </a:ln>
-          <a:extLst>
-            <a:ext uri="{909E8E84-426E-40DD-AFC4-6F175D3DCCD1}">
-              <a14:hiddenFill xmlns:a14="http://schemas.microsoft.com/office/drawing/2010/main">
-                <a:solidFill>
-                  <a:srgbClr val="FFFFFF"/>
-                </a:solidFill>
-              </a14:hiddenFill>
-            </a:ext>
-            <a:ext uri="{91240B29-F687-4F45-9708-019B960494DF}">
-              <a14:hiddenLine xmlns:a14="http://schemas.microsoft.com/office/drawing/2010/main" w="9525">
-                <a:solidFill>
-                  <a:srgbClr val="000000"/>
-                </a:solidFill>
-                <a:miter lim="800000"/>
-                <a:headEnd/>
-                <a:tailEnd/>
-              </a14:hiddenLine>
-            </a:ext>
-          </a:extLst>
-        </p:spPr>
-        <p:txBody>
-          <a:bodyPr wrap="square">
-            <a:spAutoFit/>
-          </a:bodyPr>
-          <a:lstStyle>
-            <a:lvl1pPr>
-              <a:defRPr>
-                <a:solidFill>
-                  <a:schemeClr val="tx1"/>
-                </a:solidFill>
-                <a:latin typeface="Calibri" panose="020F0502020204030204" pitchFamily="34" charset="0"/>
-              </a:defRPr>
-            </a:lvl1pPr>
-            <a:lvl2pPr marL="742950" indent="-285750">
-              <a:defRPr>
-                <a:solidFill>
-                  <a:schemeClr val="tx1"/>
-                </a:solidFill>
-                <a:latin typeface="Calibri" panose="020F0502020204030204" pitchFamily="34" charset="0"/>
-              </a:defRPr>
-            </a:lvl2pPr>
-            <a:lvl3pPr marL="1143000" indent="-228600">
-              <a:defRPr>
-                <a:solidFill>
-                  <a:schemeClr val="tx1"/>
-                </a:solidFill>
-                <a:latin typeface="Calibri" panose="020F0502020204030204" pitchFamily="34" charset="0"/>
-              </a:defRPr>
-            </a:lvl3pPr>
-            <a:lvl4pPr marL="1600200" indent="-228600">
-              <a:defRPr>
-                <a:solidFill>
-                  <a:schemeClr val="tx1"/>
-                </a:solidFill>
-                <a:latin typeface="Calibri" panose="020F0502020204030204" pitchFamily="34" charset="0"/>
-              </a:defRPr>
-            </a:lvl4pPr>
-            <a:lvl5pPr marL="2057400" indent="-228600">
-              <a:defRPr>
-                <a:solidFill>
-                  <a:schemeClr val="tx1"/>
-                </a:solidFill>
-                <a:latin typeface="Calibri" panose="020F0502020204030204" pitchFamily="34" charset="0"/>
-              </a:defRPr>
-            </a:lvl5pPr>
-            <a:lvl6pPr marL="2514600" indent="-228600" eaLnBrk="0" fontAlgn="base" hangingPunct="0">
-              <a:spcBef>
-                <a:spcPct val="0"/>
-              </a:spcBef>
-              <a:spcAft>
-                <a:spcPct val="0"/>
-              </a:spcAft>
-              <a:defRPr>
-                <a:solidFill>
-                  <a:schemeClr val="tx1"/>
-                </a:solidFill>
-                <a:latin typeface="Calibri" panose="020F0502020204030204" pitchFamily="34" charset="0"/>
-              </a:defRPr>
-            </a:lvl6pPr>
-            <a:lvl7pPr marL="2971800" indent="-228600" eaLnBrk="0" fontAlgn="base" hangingPunct="0">
-              <a:spcBef>
-                <a:spcPct val="0"/>
-              </a:spcBef>
-              <a:spcAft>
-                <a:spcPct val="0"/>
-              </a:spcAft>
-              <a:defRPr>
-                <a:solidFill>
-                  <a:schemeClr val="tx1"/>
-                </a:solidFill>
-                <a:latin typeface="Calibri" panose="020F0502020204030204" pitchFamily="34" charset="0"/>
-              </a:defRPr>
-            </a:lvl7pPr>
-            <a:lvl8pPr marL="3429000" indent="-228600" eaLnBrk="0" fontAlgn="base" hangingPunct="0">
-              <a:spcBef>
-                <a:spcPct val="0"/>
-              </a:spcBef>
-              <a:spcAft>
-                <a:spcPct val="0"/>
-              </a:spcAft>
-              <a:defRPr>
-                <a:solidFill>
-                  <a:schemeClr val="tx1"/>
-                </a:solidFill>
-                <a:latin typeface="Calibri" panose="020F0502020204030204" pitchFamily="34" charset="0"/>
-              </a:defRPr>
-            </a:lvl8pPr>
-            <a:lvl9pPr marL="3886200" indent="-228600" eaLnBrk="0" fontAlgn="base" hangingPunct="0">
-              <a:spcBef>
-                <a:spcPct val="0"/>
-              </a:spcBef>
-              <a:spcAft>
-                <a:spcPct val="0"/>
-              </a:spcAft>
-              <a:defRPr>
-                <a:solidFill>
-                  <a:schemeClr val="tx1"/>
-                </a:solidFill>
-                <a:latin typeface="Calibri" panose="020F0502020204030204" pitchFamily="34" charset="0"/>
-              </a:defRPr>
-            </a:lvl9pPr>
-          </a:lstStyle>
-          <a:p>
-            <a:pPr algn="ctr" eaLnBrk="1" hangingPunct="1"/>
-            <a:r>
-              <a:rPr lang="en-US" altLang="en-US" sz="1100" dirty="0">
-                <a:latin typeface="Arial" panose="020B0604020202020204" pitchFamily="34" charset="0"/>
-                <a:ea typeface="Amazon Ember" panose="020B0603020204020204" pitchFamily="34" charset="0"/>
-                <a:cs typeface="Arial" panose="020B0604020202020204" pitchFamily="34" charset="0"/>
-              </a:rPr>
-              <a:t>Elastic network interface</a:t>
-            </a:r>
-          </a:p>
-        </p:txBody>
-      </p:sp>
-      <p:pic>
-        <p:nvPicPr>
-          <p:cNvPr id="55" name="Graphic 37">
-            <a:extLst>
-              <a:ext uri="{FF2B5EF4-FFF2-40B4-BE49-F238E27FC236}">
-                <a16:creationId xmlns:a16="http://schemas.microsoft.com/office/drawing/2014/main" id="{D8E6347C-E12E-4441-83D9-54D12AFF9926}"/>
-              </a:ext>
-            </a:extLst>
-          </p:cNvPr>
-          <p:cNvPicPr>
-            <a:picLocks noChangeAspect="1" noChangeArrowheads="1"/>
-          </p:cNvPicPr>
-          <p:nvPr/>
-        </p:nvPicPr>
-        <p:blipFill>
-          <a:blip r:embed="rId18">
-            <a:extLst>
-              <a:ext uri="{28A0092B-C50C-407E-A947-70E740481C1C}">
-                <a14:useLocalDpi xmlns:a14="http://schemas.microsoft.com/office/drawing/2010/main" val="0"/>
-              </a:ext>
-            </a:extLst>
-          </a:blip>
-          <a:srcRect/>
-          <a:stretch>
-            <a:fillRect/>
-          </a:stretch>
-        </p:blipFill>
-        <p:spPr bwMode="auto">
-          <a:xfrm>
-            <a:off x="10267165" y="3696042"/>
-            <a:ext cx="457200" cy="457200"/>
-          </a:xfrm>
-          <a:prstGeom prst="rect">
-            <a:avLst/>
-          </a:prstGeom>
-          <a:noFill/>
-          <a:ln>
-            <a:noFill/>
-          </a:ln>
-          <a:extLst>
-            <a:ext uri="{909E8E84-426E-40DD-AFC4-6F175D3DCCD1}">
-              <a14:hiddenFill xmlns:a14="http://schemas.microsoft.com/office/drawing/2010/main">
-                <a:solidFill>
-                  <a:srgbClr val="FFFFFF"/>
-                </a:solidFill>
-              </a14:hiddenFill>
-            </a:ext>
-            <a:ext uri="{91240B29-F687-4F45-9708-019B960494DF}">
-              <a14:hiddenLine xmlns:a14="http://schemas.microsoft.com/office/drawing/2010/main" w="9525">
-                <a:solidFill>
-                  <a:srgbClr val="000000"/>
-                </a:solidFill>
-                <a:miter lim="800000"/>
-                <a:headEnd/>
-                <a:tailEnd/>
-              </a14:hiddenLine>
-            </a:ext>
-          </a:extLst>
-        </p:spPr>
-      </p:pic>
       <p:pic>
         <p:nvPicPr>
           <p:cNvPr id="75" name="Graphic 13">
@@ -7272,7 +6770,7 @@
           <p:nvPr/>
         </p:nvPicPr>
         <p:blipFill>
-          <a:blip r:embed="rId19">
+          <a:blip r:embed="rId17">
             <a:extLst>
               <a:ext uri="{28A0092B-C50C-407E-A947-70E740481C1C}">
                 <a14:useLocalDpi xmlns:a14="http://schemas.microsoft.com/office/drawing/2010/main" val="0"/>
@@ -7286,7 +6784,7 @@
         </p:blipFill>
         <p:spPr bwMode="auto">
           <a:xfrm>
-            <a:off x="4052550" y="6436975"/>
+            <a:off x="4052550" y="5344775"/>
             <a:ext cx="469900" cy="469900"/>
           </a:xfrm>
           <a:prstGeom prst="rect">
@@ -7332,7 +6830,7 @@
           <p:nvPr/>
         </p:nvPicPr>
         <p:blipFill>
-          <a:blip r:embed="rId19">
+          <a:blip r:embed="rId17">
             <a:extLst>
               <a:ext uri="{28A0092B-C50C-407E-A947-70E740481C1C}">
                 <a14:useLocalDpi xmlns:a14="http://schemas.microsoft.com/office/drawing/2010/main" val="0"/>
@@ -7346,7 +6844,7 @@
         </p:blipFill>
         <p:spPr bwMode="auto">
           <a:xfrm>
-            <a:off x="8804143" y="6453196"/>
+            <a:off x="8804143" y="5360996"/>
             <a:ext cx="469900" cy="469900"/>
           </a:xfrm>
           <a:prstGeom prst="rect">
@@ -7392,7 +6890,7 @@
           <p:nvPr/>
         </p:nvPicPr>
         <p:blipFill>
-          <a:blip r:embed="rId9">
+          <a:blip r:embed="rId8">
             <a:extLst>
               <a:ext uri="{28A0092B-C50C-407E-A947-70E740481C1C}">
                 <a14:useLocalDpi xmlns:a14="http://schemas.microsoft.com/office/drawing/2010/main" val="0"/>
@@ -7406,7 +6904,7 @@
         </p:blipFill>
         <p:spPr bwMode="auto">
           <a:xfrm>
-            <a:off x="10277129" y="4879806"/>
+            <a:off x="10267165" y="3680460"/>
             <a:ext cx="457200" cy="457200"/>
           </a:xfrm>
           <a:prstGeom prst="rect">
@@ -7453,7 +6951,7 @@
         </p:nvSpPr>
         <p:spPr bwMode="auto">
           <a:xfrm>
-            <a:off x="9983944" y="5325451"/>
+            <a:off x="9937981" y="4153707"/>
             <a:ext cx="1115568" cy="430887"/>
           </a:xfrm>
           <a:prstGeom prst="rect">
@@ -7614,7 +7112,7 @@
         </p:nvSpPr>
         <p:spPr bwMode="auto">
           <a:xfrm>
-            <a:off x="5019020" y="6919507"/>
+            <a:off x="5019020" y="5810886"/>
             <a:ext cx="1342852" cy="430887"/>
           </a:xfrm>
           <a:prstGeom prst="rect">
@@ -7788,7 +7286,7 @@
         </p:blipFill>
         <p:spPr bwMode="auto">
           <a:xfrm>
-            <a:off x="5459884" y="6443325"/>
+            <a:off x="5459884" y="5334704"/>
             <a:ext cx="457200" cy="457200"/>
           </a:xfrm>
           <a:prstGeom prst="rect">
@@ -7835,7 +7333,7 @@
         </p:nvSpPr>
         <p:spPr bwMode="auto">
           <a:xfrm>
-            <a:off x="9854628" y="6906875"/>
+            <a:off x="9854628" y="5814675"/>
             <a:ext cx="1342852" cy="430887"/>
           </a:xfrm>
           <a:prstGeom prst="rect">
@@ -8009,7 +7507,7 @@
         </p:blipFill>
         <p:spPr bwMode="auto">
           <a:xfrm>
-            <a:off x="10267165" y="6426904"/>
+            <a:off x="10267165" y="5334704"/>
             <a:ext cx="457200" cy="457200"/>
           </a:xfrm>
           <a:prstGeom prst="rect">
@@ -8042,62 +7540,21 @@
       </p:pic>
       <p:cxnSp>
         <p:nvCxnSpPr>
-          <p:cNvPr id="81" name="Straight Arrow Connector 80">
+          <p:cNvPr id="84" name="Straight Arrow Connector 83">
             <a:extLst>
               <a:ext uri="{FF2B5EF4-FFF2-40B4-BE49-F238E27FC236}">
-                <a16:creationId xmlns:a16="http://schemas.microsoft.com/office/drawing/2014/main" id="{9CBBDBFF-F4E0-48D4-9F11-C3EE374C1A28}"/>
+                <a16:creationId xmlns:a16="http://schemas.microsoft.com/office/drawing/2014/main" id="{FB35EED3-368B-47F7-9B1C-0121C77DBDB4}"/>
               </a:ext>
             </a:extLst>
           </p:cNvPr>
-          <p:cNvCxnSpPr/>
+          <p:cNvCxnSpPr>
+            <a:cxnSpLocks/>
+          </p:cNvCxnSpPr>
           <p:nvPr/>
         </p:nvCxnSpPr>
         <p:spPr>
-          <a:xfrm rot="16200000">
-            <a:off x="5511503" y="4684120"/>
-            <a:ext cx="365760" cy="0"/>
-          </a:xfrm>
-          <a:prstGeom prst="straightConnector1">
-            <a:avLst/>
-          </a:prstGeom>
-          <a:ln w="12700">
-            <a:solidFill>
-              <a:schemeClr val="tx2"/>
-            </a:solidFill>
-            <a:headEnd type="none" w="med" len="sm"/>
-            <a:tailEnd type="arrow" w="med" len="sm"/>
-          </a:ln>
-        </p:spPr>
-        <p:style>
-          <a:lnRef idx="1">
-            <a:schemeClr val="accent1"/>
-          </a:lnRef>
-          <a:fillRef idx="0">
-            <a:schemeClr val="accent1"/>
-          </a:fillRef>
-          <a:effectRef idx="0">
-            <a:schemeClr val="accent1"/>
-          </a:effectRef>
-          <a:fontRef idx="minor">
-            <a:schemeClr val="tx1"/>
-          </a:fontRef>
-        </p:style>
-      </p:cxnSp>
-      <p:cxnSp>
-        <p:nvCxnSpPr>
-          <p:cNvPr id="82" name="Straight Arrow Connector 81">
-            <a:extLst>
-              <a:ext uri="{FF2B5EF4-FFF2-40B4-BE49-F238E27FC236}">
-                <a16:creationId xmlns:a16="http://schemas.microsoft.com/office/drawing/2014/main" id="{6B1AB39D-DCF5-42D8-B51A-E53F22A39571}"/>
-              </a:ext>
-            </a:extLst>
-          </p:cNvPr>
-          <p:cNvCxnSpPr/>
-          <p:nvPr/>
-        </p:nvCxnSpPr>
-        <p:spPr>
-          <a:xfrm rot="16200000">
-            <a:off x="5322724" y="6080740"/>
+          <a:xfrm rot="-5400000">
+            <a:off x="5322724" y="4945555"/>
             <a:ext cx="731520" cy="0"/>
           </a:xfrm>
           <a:prstGeom prst="straightConnector1">
@@ -8128,62 +7585,21 @@
       </p:cxnSp>
       <p:cxnSp>
         <p:nvCxnSpPr>
-          <p:cNvPr id="83" name="Straight Arrow Connector 82">
+          <p:cNvPr id="68" name="Straight Arrow Connector 67">
             <a:extLst>
               <a:ext uri="{FF2B5EF4-FFF2-40B4-BE49-F238E27FC236}">
-                <a16:creationId xmlns:a16="http://schemas.microsoft.com/office/drawing/2014/main" id="{8AC175C4-D884-497F-A284-72B992B23D29}"/>
+                <a16:creationId xmlns:a16="http://schemas.microsoft.com/office/drawing/2014/main" id="{835AE074-69FA-43AF-8616-FA316F745682}"/>
               </a:ext>
             </a:extLst>
           </p:cNvPr>
-          <p:cNvCxnSpPr/>
+          <p:cNvCxnSpPr>
+            <a:cxnSpLocks/>
+          </p:cNvCxnSpPr>
           <p:nvPr/>
         </p:nvCxnSpPr>
         <p:spPr>
-          <a:xfrm rot="16200000">
-            <a:off x="10331153" y="4712695"/>
-            <a:ext cx="365760" cy="0"/>
-          </a:xfrm>
-          <a:prstGeom prst="straightConnector1">
-            <a:avLst/>
-          </a:prstGeom>
-          <a:ln w="12700">
-            <a:solidFill>
-              <a:schemeClr val="tx2"/>
-            </a:solidFill>
-            <a:headEnd type="none" w="med" len="sm"/>
-            <a:tailEnd type="arrow" w="med" len="sm"/>
-          </a:ln>
-        </p:spPr>
-        <p:style>
-          <a:lnRef idx="1">
-            <a:schemeClr val="accent1"/>
-          </a:lnRef>
-          <a:fillRef idx="0">
-            <a:schemeClr val="accent1"/>
-          </a:fillRef>
-          <a:effectRef idx="0">
-            <a:schemeClr val="accent1"/>
-          </a:effectRef>
-          <a:fontRef idx="minor">
-            <a:schemeClr val="tx1"/>
-          </a:fontRef>
-        </p:style>
-      </p:cxnSp>
-      <p:cxnSp>
-        <p:nvCxnSpPr>
-          <p:cNvPr id="84" name="Straight Arrow Connector 83">
-            <a:extLst>
-              <a:ext uri="{FF2B5EF4-FFF2-40B4-BE49-F238E27FC236}">
-                <a16:creationId xmlns:a16="http://schemas.microsoft.com/office/drawing/2014/main" id="{FB35EED3-368B-47F7-9B1C-0121C77DBDB4}"/>
-              </a:ext>
-            </a:extLst>
-          </p:cNvPr>
-          <p:cNvCxnSpPr/>
-          <p:nvPr/>
-        </p:nvCxnSpPr>
-        <p:spPr>
-          <a:xfrm rot="16200000">
-            <a:off x="10142374" y="6080740"/>
+          <a:xfrm rot="-5400000">
+            <a:off x="10130005" y="4952553"/>
             <a:ext cx="731520" cy="0"/>
           </a:xfrm>
           <a:prstGeom prst="straightConnector1">
@@ -8212,6 +7628,287 @@
           </a:fontRef>
         </p:style>
       </p:cxnSp>
+      <p:pic>
+        <p:nvPicPr>
+          <p:cNvPr id="54" name="Graphic 8">
+            <a:extLst>
+              <a:ext uri="{FF2B5EF4-FFF2-40B4-BE49-F238E27FC236}">
+                <a16:creationId xmlns:a16="http://schemas.microsoft.com/office/drawing/2014/main" id="{365C42B0-F011-413A-968C-D484139D60EF}"/>
+              </a:ext>
+            </a:extLst>
+          </p:cNvPr>
+          <p:cNvPicPr>
+            <a:picLocks noChangeAspect="1" noChangeArrowheads="1"/>
+          </p:cNvPicPr>
+          <p:nvPr/>
+        </p:nvPicPr>
+        <p:blipFill>
+          <a:blip r:embed="rId19">
+            <a:extLst>
+              <a:ext uri="{28A0092B-C50C-407E-A947-70E740481C1C}">
+                <a14:useLocalDpi xmlns:a14="http://schemas.microsoft.com/office/drawing/2010/main" val="0"/>
+              </a:ext>
+            </a:extLst>
+          </a:blip>
+          <a:srcRect/>
+          <a:stretch>
+            <a:fillRect/>
+          </a:stretch>
+        </p:blipFill>
+        <p:spPr bwMode="auto">
+          <a:xfrm>
+            <a:off x="11838593" y="4591691"/>
+            <a:ext cx="469900" cy="469900"/>
+          </a:xfrm>
+          <a:prstGeom prst="rect">
+            <a:avLst/>
+          </a:prstGeom>
+          <a:noFill/>
+          <a:ln>
+            <a:noFill/>
+          </a:ln>
+          <a:extLst>
+            <a:ext uri="{909E8E84-426E-40DD-AFC4-6F175D3DCCD1}">
+              <a14:hiddenFill xmlns:a14="http://schemas.microsoft.com/office/drawing/2010/main">
+                <a:solidFill>
+                  <a:srgbClr val="FFFFFF"/>
+                </a:solidFill>
+              </a14:hiddenFill>
+            </a:ext>
+            <a:ext uri="{91240B29-F687-4F45-9708-019B960494DF}">
+              <a14:hiddenLine xmlns:a14="http://schemas.microsoft.com/office/drawing/2010/main" w="9525">
+                <a:solidFill>
+                  <a:srgbClr val="000000"/>
+                </a:solidFill>
+                <a:miter lim="800000"/>
+                <a:headEnd/>
+                <a:tailEnd/>
+              </a14:hiddenLine>
+            </a:ext>
+          </a:extLst>
+        </p:spPr>
+      </p:pic>
+      <p:pic>
+        <p:nvPicPr>
+          <p:cNvPr id="55" name="Graphic 19">
+            <a:extLst>
+              <a:ext uri="{FF2B5EF4-FFF2-40B4-BE49-F238E27FC236}">
+                <a16:creationId xmlns:a16="http://schemas.microsoft.com/office/drawing/2014/main" id="{6E09EC84-CB97-4AFA-A298-FE1A6CDC6AB7}"/>
+              </a:ext>
+            </a:extLst>
+          </p:cNvPr>
+          <p:cNvPicPr>
+            <a:picLocks noChangeAspect="1" noChangeArrowheads="1"/>
+          </p:cNvPicPr>
+          <p:nvPr/>
+        </p:nvPicPr>
+        <p:blipFill>
+          <a:blip r:embed="rId20">
+            <a:extLst>
+              <a:ext uri="{28A0092B-C50C-407E-A947-70E740481C1C}">
+                <a14:useLocalDpi xmlns:a14="http://schemas.microsoft.com/office/drawing/2010/main" val="0"/>
+              </a:ext>
+            </a:extLst>
+          </a:blip>
+          <a:srcRect/>
+          <a:stretch>
+            <a:fillRect/>
+          </a:stretch>
+        </p:blipFill>
+        <p:spPr bwMode="auto">
+          <a:xfrm>
+            <a:off x="11656868" y="3110491"/>
+            <a:ext cx="762000" cy="762000"/>
+          </a:xfrm>
+          <a:prstGeom prst="rect">
+            <a:avLst/>
+          </a:prstGeom>
+          <a:noFill/>
+          <a:ln>
+            <a:noFill/>
+          </a:ln>
+          <a:extLst>
+            <a:ext uri="{909E8E84-426E-40DD-AFC4-6F175D3DCCD1}">
+              <a14:hiddenFill xmlns:a14="http://schemas.microsoft.com/office/drawing/2010/main">
+                <a:solidFill>
+                  <a:srgbClr val="FFFFFF"/>
+                </a:solidFill>
+              </a14:hiddenFill>
+            </a:ext>
+            <a:ext uri="{91240B29-F687-4F45-9708-019B960494DF}">
+              <a14:hiddenLine xmlns:a14="http://schemas.microsoft.com/office/drawing/2010/main" w="9525">
+                <a:solidFill>
+                  <a:srgbClr val="000000"/>
+                </a:solidFill>
+                <a:miter lim="800000"/>
+                <a:headEnd/>
+                <a:tailEnd/>
+              </a14:hiddenLine>
+            </a:ext>
+          </a:extLst>
+        </p:spPr>
+      </p:pic>
+      <p:sp>
+        <p:nvSpPr>
+          <p:cNvPr id="72" name="TextBox 9">
+            <a:extLst>
+              <a:ext uri="{FF2B5EF4-FFF2-40B4-BE49-F238E27FC236}">
+                <a16:creationId xmlns:a16="http://schemas.microsoft.com/office/drawing/2014/main" id="{1CCB5980-141B-4B40-A1F8-AB6BE7E0C6CF}"/>
+              </a:ext>
+            </a:extLst>
+          </p:cNvPr>
+          <p:cNvSpPr txBox="1">
+            <a:spLocks noChangeArrowheads="1"/>
+          </p:cNvSpPr>
+          <p:nvPr/>
+        </p:nvSpPr>
+        <p:spPr bwMode="auto">
+          <a:xfrm>
+            <a:off x="11471246" y="3945328"/>
+            <a:ext cx="1204595" cy="276999"/>
+          </a:xfrm>
+          <a:prstGeom prst="rect">
+            <a:avLst/>
+          </a:prstGeom>
+          <a:noFill/>
+          <a:ln>
+            <a:noFill/>
+          </a:ln>
+          <a:extLst>
+            <a:ext uri="{909E8E84-426E-40DD-AFC4-6F175D3DCCD1}">
+              <a14:hiddenFill xmlns:a14="http://schemas.microsoft.com/office/drawing/2010/main">
+                <a:solidFill>
+                  <a:srgbClr val="FFFFFF"/>
+                </a:solidFill>
+              </a14:hiddenFill>
+            </a:ext>
+            <a:ext uri="{91240B29-F687-4F45-9708-019B960494DF}">
+              <a14:hiddenLine xmlns:a14="http://schemas.microsoft.com/office/drawing/2010/main" w="9525">
+                <a:solidFill>
+                  <a:srgbClr val="000000"/>
+                </a:solidFill>
+                <a:miter lim="800000"/>
+                <a:headEnd/>
+                <a:tailEnd/>
+              </a14:hiddenLine>
+            </a:ext>
+          </a:extLst>
+        </p:spPr>
+        <p:txBody>
+          <a:bodyPr wrap="square">
+            <a:spAutoFit/>
+          </a:bodyPr>
+          <a:lstStyle>
+            <a:lvl1pPr>
+              <a:defRPr>
+                <a:solidFill>
+                  <a:schemeClr val="tx1"/>
+                </a:solidFill>
+                <a:latin typeface="Calibri" panose="020F0502020204030204" pitchFamily="34" charset="0"/>
+              </a:defRPr>
+            </a:lvl1pPr>
+            <a:lvl2pPr marL="742950" indent="-285750">
+              <a:defRPr>
+                <a:solidFill>
+                  <a:schemeClr val="tx1"/>
+                </a:solidFill>
+                <a:latin typeface="Calibri" panose="020F0502020204030204" pitchFamily="34" charset="0"/>
+              </a:defRPr>
+            </a:lvl2pPr>
+            <a:lvl3pPr marL="1143000" indent="-228600">
+              <a:defRPr>
+                <a:solidFill>
+                  <a:schemeClr val="tx1"/>
+                </a:solidFill>
+                <a:latin typeface="Calibri" panose="020F0502020204030204" pitchFamily="34" charset="0"/>
+              </a:defRPr>
+            </a:lvl3pPr>
+            <a:lvl4pPr marL="1600200" indent="-228600">
+              <a:defRPr>
+                <a:solidFill>
+                  <a:schemeClr val="tx1"/>
+                </a:solidFill>
+                <a:latin typeface="Calibri" panose="020F0502020204030204" pitchFamily="34" charset="0"/>
+              </a:defRPr>
+            </a:lvl4pPr>
+            <a:lvl5pPr marL="2057400" indent="-228600">
+              <a:defRPr>
+                <a:solidFill>
+                  <a:schemeClr val="tx1"/>
+                </a:solidFill>
+                <a:latin typeface="Calibri" panose="020F0502020204030204" pitchFamily="34" charset="0"/>
+              </a:defRPr>
+            </a:lvl5pPr>
+            <a:lvl6pPr marL="2514600" indent="-228600" eaLnBrk="0" fontAlgn="base" hangingPunct="0">
+              <a:spcBef>
+                <a:spcPct val="0"/>
+              </a:spcBef>
+              <a:spcAft>
+                <a:spcPct val="0"/>
+              </a:spcAft>
+              <a:defRPr>
+                <a:solidFill>
+                  <a:schemeClr val="tx1"/>
+                </a:solidFill>
+                <a:latin typeface="Calibri" panose="020F0502020204030204" pitchFamily="34" charset="0"/>
+              </a:defRPr>
+            </a:lvl6pPr>
+            <a:lvl7pPr marL="2971800" indent="-228600" eaLnBrk="0" fontAlgn="base" hangingPunct="0">
+              <a:spcBef>
+                <a:spcPct val="0"/>
+              </a:spcBef>
+              <a:spcAft>
+                <a:spcPct val="0"/>
+              </a:spcAft>
+              <a:defRPr>
+                <a:solidFill>
+                  <a:schemeClr val="tx1"/>
+                </a:solidFill>
+                <a:latin typeface="Calibri" panose="020F0502020204030204" pitchFamily="34" charset="0"/>
+              </a:defRPr>
+            </a:lvl7pPr>
+            <a:lvl8pPr marL="3429000" indent="-228600" eaLnBrk="0" fontAlgn="base" hangingPunct="0">
+              <a:spcBef>
+                <a:spcPct val="0"/>
+              </a:spcBef>
+              <a:spcAft>
+                <a:spcPct val="0"/>
+              </a:spcAft>
+              <a:defRPr>
+                <a:solidFill>
+                  <a:schemeClr val="tx1"/>
+                </a:solidFill>
+                <a:latin typeface="Calibri" panose="020F0502020204030204" pitchFamily="34" charset="0"/>
+              </a:defRPr>
+            </a:lvl8pPr>
+            <a:lvl9pPr marL="3886200" indent="-228600" eaLnBrk="0" fontAlgn="base" hangingPunct="0">
+              <a:spcBef>
+                <a:spcPct val="0"/>
+              </a:spcBef>
+              <a:spcAft>
+                <a:spcPct val="0"/>
+              </a:spcAft>
+              <a:defRPr>
+                <a:solidFill>
+                  <a:schemeClr val="tx1"/>
+                </a:solidFill>
+                <a:latin typeface="Calibri" panose="020F0502020204030204" pitchFamily="34" charset="0"/>
+              </a:defRPr>
+            </a:lvl9pPr>
+          </a:lstStyle>
+          <a:p>
+            <a:pPr algn="ctr" eaLnBrk="1" hangingPunct="1"/>
+            <a:r>
+              <a:rPr lang="en-US" altLang="en-US" sz="1200" dirty="0">
+                <a:latin typeface="Arial" panose="020B0604020202020204" pitchFamily="34" charset="0"/>
+                <a:ea typeface="Amazon Ember" panose="020B0603020204020204" pitchFamily="34" charset="0"/>
+                <a:cs typeface="Arial" panose="020B0604020202020204" pitchFamily="34" charset="0"/>
+              </a:rPr>
+              <a:t>AWS IAM</a:t>
+            </a:r>
+          </a:p>
+        </p:txBody>
+      </p:sp>
     </p:spTree>
     <p:extLst>
       <p:ext uri="{BB962C8B-B14F-4D97-AF65-F5344CB8AC3E}">

</xml_diff>